<commit_message>
Actualizacion presentacion sprint 1
-Agregados diseños:
*Personaje principal
*Enemigos
*Mapa
*Armas
</commit_message>
<xml_diff>
--- a/burndown y trabajo de equipo/Presentacion Sprint 1.pptx
+++ b/burndown y trabajo de equipo/Presentacion Sprint 1.pptx
@@ -14,6 +14,10 @@
     <p:sldId id="262" r:id="rId8"/>
     <p:sldId id="261" r:id="rId9"/>
     <p:sldId id="263" r:id="rId10"/>
+    <p:sldId id="265" r:id="rId11"/>
+    <p:sldId id="266" r:id="rId12"/>
+    <p:sldId id="267" r:id="rId13"/>
+    <p:sldId id="268" r:id="rId14"/>
   </p:sldIdLst>
   <p:sldSz cx="12192000" cy="6858000"/>
   <p:notesSz cx="6858000" cy="9144000"/>
@@ -112,6 +116,11 @@
       </a:defRPr>
     </a:lvl9pPr>
   </p:defaultTextStyle>
+  <p:extLst>
+    <p:ext uri="{EFAFB233-063F-42B5-8137-9DF3F51BA10A}">
+      <p15:sldGuideLst xmlns:p15="http://schemas.microsoft.com/office/powerpoint/2012/main"/>
+    </p:ext>
+  </p:extLst>
 </p:presentation>
 </file>
 
@@ -861,7 +870,7 @@
             <a:fld id="{B61BEF0D-F0BB-DE4B-95CE-6DB70DBA9567}" type="datetimeFigureOut">
               <a:rPr lang="en-US" dirty="0"/>
               <a:pPr/>
-              <a:t>11/5/2018</a:t>
+              <a:t>11/6/2018</a:t>
             </a:fld>
             <a:endParaRPr lang="en-US" dirty="0"/>
           </a:p>
@@ -1109,7 +1118,7 @@
             <a:fld id="{B61BEF0D-F0BB-DE4B-95CE-6DB70DBA9567}" type="datetimeFigureOut">
               <a:rPr lang="en-US" dirty="0"/>
               <a:pPr/>
-              <a:t>11/5/2018</a:t>
+              <a:t>11/6/2018</a:t>
             </a:fld>
             <a:endParaRPr lang="en-US" dirty="0"/>
           </a:p>
@@ -1420,7 +1429,7 @@
             <a:fld id="{B61BEF0D-F0BB-DE4B-95CE-6DB70DBA9567}" type="datetimeFigureOut">
               <a:rPr lang="en-US" dirty="0"/>
               <a:pPr/>
-              <a:t>11/5/2018</a:t>
+              <a:t>11/6/2018</a:t>
             </a:fld>
             <a:endParaRPr lang="en-US" dirty="0"/>
           </a:p>
@@ -1750,7 +1759,7 @@
             <a:fld id="{B61BEF0D-F0BB-DE4B-95CE-6DB70DBA9567}" type="datetimeFigureOut">
               <a:rPr lang="en-US" dirty="0"/>
               <a:pPr/>
-              <a:t>11/5/2018</a:t>
+              <a:t>11/6/2018</a:t>
             </a:fld>
             <a:endParaRPr lang="en-US" dirty="0"/>
           </a:p>
@@ -2061,7 +2070,7 @@
             <a:fld id="{B61BEF0D-F0BB-DE4B-95CE-6DB70DBA9567}" type="datetimeFigureOut">
               <a:rPr lang="en-US" dirty="0"/>
               <a:pPr/>
-              <a:t>11/5/2018</a:t>
+              <a:t>11/6/2018</a:t>
             </a:fld>
             <a:endParaRPr lang="en-US" dirty="0"/>
           </a:p>
@@ -2451,7 +2460,7 @@
             <a:fld id="{B61BEF0D-F0BB-DE4B-95CE-6DB70DBA9567}" type="datetimeFigureOut">
               <a:rPr lang="en-US" dirty="0"/>
               <a:pPr/>
-              <a:t>11/5/2018</a:t>
+              <a:t>11/6/2018</a:t>
             </a:fld>
             <a:endParaRPr lang="en-US" dirty="0"/>
           </a:p>
@@ -2617,7 +2626,7 @@
           <a:p>
             <a:fld id="{55C6B4A9-1611-4792-9094-5F34BCA07E0B}" type="datetimeFigureOut">
               <a:rPr lang="en-US" dirty="0"/>
-              <a:t>11/5/2018</a:t>
+              <a:t>11/6/2018</a:t>
             </a:fld>
             <a:endParaRPr lang="en-US" dirty="0"/>
           </a:p>
@@ -2793,7 +2802,7 @@
             <a:fld id="{B61BEF0D-F0BB-DE4B-95CE-6DB70DBA9567}" type="datetimeFigureOut">
               <a:rPr lang="en-US" dirty="0"/>
               <a:pPr/>
-              <a:t>11/5/2018</a:t>
+              <a:t>11/6/2018</a:t>
             </a:fld>
             <a:endParaRPr lang="en-US" dirty="0"/>
           </a:p>
@@ -2959,7 +2968,7 @@
           <a:p>
             <a:fld id="{42A54C80-263E-416B-A8E0-580EDEADCBDC}" type="datetimeFigureOut">
               <a:rPr lang="en-US" dirty="0"/>
-              <a:t>11/5/2018</a:t>
+              <a:t>11/6/2018</a:t>
             </a:fld>
             <a:endParaRPr lang="en-US" dirty="0"/>
           </a:p>
@@ -3202,7 +3211,7 @@
             <a:fld id="{B61BEF0D-F0BB-DE4B-95CE-6DB70DBA9567}" type="datetimeFigureOut">
               <a:rPr lang="en-US" dirty="0"/>
               <a:pPr/>
-              <a:t>11/5/2018</a:t>
+              <a:t>11/6/2018</a:t>
             </a:fld>
             <a:endParaRPr lang="en-US" dirty="0"/>
           </a:p>
@@ -3430,7 +3439,7 @@
           <a:p>
             <a:fld id="{42A54C80-263E-416B-A8E0-580EDEADCBDC}" type="datetimeFigureOut">
               <a:rPr lang="en-US" dirty="0"/>
-              <a:t>11/5/2018</a:t>
+              <a:t>11/6/2018</a:t>
             </a:fld>
             <a:endParaRPr lang="en-US" dirty="0"/>
           </a:p>
@@ -3800,7 +3809,7 @@
             <a:fld id="{B61BEF0D-F0BB-DE4B-95CE-6DB70DBA9567}" type="datetimeFigureOut">
               <a:rPr lang="en-US" dirty="0"/>
               <a:pPr/>
-              <a:t>11/5/2018</a:t>
+              <a:t>11/6/2018</a:t>
             </a:fld>
             <a:endParaRPr lang="en-US" dirty="0"/>
           </a:p>
@@ -3920,7 +3929,7 @@
             <a:fld id="{B61BEF0D-F0BB-DE4B-95CE-6DB70DBA9567}" type="datetimeFigureOut">
               <a:rPr lang="en-US" dirty="0"/>
               <a:pPr/>
-              <a:t>11/5/2018</a:t>
+              <a:t>11/6/2018</a:t>
             </a:fld>
             <a:endParaRPr lang="en-US" dirty="0"/>
           </a:p>
@@ -4012,7 +4021,7 @@
             <a:fld id="{B61BEF0D-F0BB-DE4B-95CE-6DB70DBA9567}" type="datetimeFigureOut">
               <a:rPr lang="en-US" dirty="0"/>
               <a:pPr/>
-              <a:t>11/5/2018</a:t>
+              <a:t>11/6/2018</a:t>
             </a:fld>
             <a:endParaRPr lang="en-US" dirty="0"/>
           </a:p>
@@ -4263,7 +4272,7 @@
           <a:p>
             <a:fld id="{42A54C80-263E-416B-A8E0-580EDEADCBDC}" type="datetimeFigureOut">
               <a:rPr lang="en-US" dirty="0"/>
-              <a:t>11/5/2018</a:t>
+              <a:t>11/6/2018</a:t>
             </a:fld>
             <a:endParaRPr lang="en-US" dirty="0"/>
           </a:p>
@@ -4565,7 +4574,7 @@
             <a:fld id="{B61BEF0D-F0BB-DE4B-95CE-6DB70DBA9567}" type="datetimeFigureOut">
               <a:rPr lang="en-US" dirty="0"/>
               <a:pPr/>
-              <a:t>11/5/2018</a:t>
+              <a:t>11/6/2018</a:t>
             </a:fld>
             <a:endParaRPr lang="en-US" dirty="0"/>
           </a:p>
@@ -5263,7 +5272,7 @@
             <a:fld id="{B61BEF0D-F0BB-DE4B-95CE-6DB70DBA9567}" type="datetimeFigureOut">
               <a:rPr lang="en-US" dirty="0"/>
               <a:pPr/>
-              <a:t>11/5/2018</a:t>
+              <a:t>11/6/2018</a:t>
             </a:fld>
             <a:endParaRPr lang="en-US" dirty="0"/>
           </a:p>
@@ -5990,6 +5999,1744 @@
   <p:clrMapOvr>
     <a:masterClrMapping/>
   </p:clrMapOvr>
+  <p:timing>
+    <p:tnLst>
+      <p:par>
+        <p:cTn id="1" dur="indefinite" restart="never" nodeType="tmRoot"/>
+      </p:par>
+    </p:tnLst>
+  </p:timing>
+</p:sld>
+</file>
+
+<file path=ppt/slides/slide10.xml><?xml version="1.0" encoding="utf-8"?>
+<p:sld xmlns:a="http://schemas.openxmlformats.org/drawingml/2006/main" xmlns:r="http://schemas.openxmlformats.org/officeDocument/2006/relationships" xmlns:p="http://schemas.openxmlformats.org/presentationml/2006/main">
+  <p:cSld>
+    <p:spTree>
+      <p:nvGrpSpPr>
+        <p:cNvPr id="1" name=""/>
+        <p:cNvGrpSpPr/>
+        <p:nvPr/>
+      </p:nvGrpSpPr>
+      <p:grpSpPr>
+        <a:xfrm>
+          <a:off x="0" y="0"/>
+          <a:ext cx="0" cy="0"/>
+          <a:chOff x="0" y="0"/>
+          <a:chExt cx="0" cy="0"/>
+        </a:xfrm>
+      </p:grpSpPr>
+      <p:sp>
+        <p:nvSpPr>
+          <p:cNvPr id="2" name="Título 1"/>
+          <p:cNvSpPr>
+            <a:spLocks noGrp="1"/>
+          </p:cNvSpPr>
+          <p:nvPr>
+            <p:ph type="title"/>
+          </p:nvPr>
+        </p:nvSpPr>
+        <p:spPr>
+          <a:xfrm>
+            <a:off x="1957494" y="106138"/>
+            <a:ext cx="8596668" cy="783772"/>
+          </a:xfrm>
+        </p:spPr>
+        <p:txBody>
+          <a:bodyPr/>
+          <a:lstStyle/>
+          <a:p>
+            <a:r>
+              <a:rPr lang="es-ES" dirty="0" smtClean="0"/>
+              <a:t>Diseño del mapa y sus </a:t>
+            </a:r>
+            <a:r>
+              <a:rPr lang="es-ES" dirty="0" err="1" smtClean="0"/>
+              <a:t>hitbox</a:t>
+            </a:r>
+            <a:r>
+              <a:rPr lang="es-ES" dirty="0" smtClean="0"/>
+              <a:t>.</a:t>
+            </a:r>
+            <a:endParaRPr lang="en-US" dirty="0"/>
+          </a:p>
+        </p:txBody>
+      </p:sp>
+      <p:sp>
+        <p:nvSpPr>
+          <p:cNvPr id="3" name="Marcador de contenido 2"/>
+          <p:cNvSpPr>
+            <a:spLocks noGrp="1"/>
+          </p:cNvSpPr>
+          <p:nvPr>
+            <p:ph idx="1"/>
+          </p:nvPr>
+        </p:nvSpPr>
+        <p:spPr/>
+        <p:txBody>
+          <a:bodyPr/>
+          <a:lstStyle/>
+          <a:p>
+            <a:endParaRPr lang="en-US"/>
+          </a:p>
+        </p:txBody>
+      </p:sp>
+      <p:pic>
+        <p:nvPicPr>
+          <p:cNvPr id="1026" name="Picture 2" descr="mapa.png"/>
+          <p:cNvPicPr>
+            <a:picLocks noChangeAspect="1" noChangeArrowheads="1"/>
+          </p:cNvPicPr>
+          <p:nvPr/>
+        </p:nvPicPr>
+        <p:blipFill>
+          <a:blip r:embed="rId2">
+            <a:extLst>
+              <a:ext uri="{28A0092B-C50C-407E-A947-70E740481C1C}">
+                <a14:useLocalDpi xmlns:a14="http://schemas.microsoft.com/office/drawing/2010/main" val="0"/>
+              </a:ext>
+            </a:extLst>
+          </a:blip>
+          <a:srcRect/>
+          <a:stretch>
+            <a:fillRect/>
+          </a:stretch>
+        </p:blipFill>
+        <p:spPr bwMode="auto">
+          <a:xfrm>
+            <a:off x="1219199" y="889910"/>
+            <a:ext cx="7785463" cy="5789564"/>
+          </a:xfrm>
+          <a:prstGeom prst="rect">
+            <a:avLst/>
+          </a:prstGeom>
+          <a:noFill/>
+          <a:extLst>
+            <a:ext uri="{909E8E84-426E-40DD-AFC4-6F175D3DCCD1}">
+              <a14:hiddenFill xmlns:a14="http://schemas.microsoft.com/office/drawing/2010/main">
+                <a:solidFill>
+                  <a:srgbClr val="FFFFFF"/>
+                </a:solidFill>
+              </a14:hiddenFill>
+            </a:ext>
+          </a:extLst>
+        </p:spPr>
+      </p:pic>
+    </p:spTree>
+    <p:extLst>
+      <p:ext uri="{BB962C8B-B14F-4D97-AF65-F5344CB8AC3E}">
+        <p14:creationId xmlns:p14="http://schemas.microsoft.com/office/powerpoint/2010/main" val="2629158205"/>
+      </p:ext>
+    </p:extLst>
+  </p:cSld>
+  <p:clrMapOvr>
+    <a:masterClrMapping/>
+  </p:clrMapOvr>
+</p:sld>
+</file>
+
+<file path=ppt/slides/slide11.xml><?xml version="1.0" encoding="utf-8"?>
+<p:sld xmlns:a="http://schemas.openxmlformats.org/drawingml/2006/main" xmlns:r="http://schemas.openxmlformats.org/officeDocument/2006/relationships" xmlns:p="http://schemas.openxmlformats.org/presentationml/2006/main">
+  <p:cSld>
+    <p:spTree>
+      <p:nvGrpSpPr>
+        <p:cNvPr id="1" name=""/>
+        <p:cNvGrpSpPr/>
+        <p:nvPr/>
+      </p:nvGrpSpPr>
+      <p:grpSpPr>
+        <a:xfrm>
+          <a:off x="0" y="0"/>
+          <a:ext cx="0" cy="0"/>
+          <a:chOff x="0" y="0"/>
+          <a:chExt cx="0" cy="0"/>
+        </a:xfrm>
+      </p:grpSpPr>
+      <p:sp>
+        <p:nvSpPr>
+          <p:cNvPr id="2" name="Título 1"/>
+          <p:cNvSpPr>
+            <a:spLocks noGrp="1"/>
+          </p:cNvSpPr>
+          <p:nvPr>
+            <p:ph type="title"/>
+          </p:nvPr>
+        </p:nvSpPr>
+        <p:spPr>
+          <a:xfrm>
+            <a:off x="1217265" y="377371"/>
+            <a:ext cx="8596668" cy="1320800"/>
+          </a:xfrm>
+        </p:spPr>
+        <p:txBody>
+          <a:bodyPr/>
+          <a:lstStyle/>
+          <a:p>
+            <a:r>
+              <a:rPr lang="es-ES" dirty="0" smtClean="0"/>
+              <a:t>            Personaje principal.</a:t>
+            </a:r>
+            <a:endParaRPr lang="en-US" dirty="0"/>
+          </a:p>
+        </p:txBody>
+      </p:sp>
+      <p:sp>
+        <p:nvSpPr>
+          <p:cNvPr id="3" name="Marcador de contenido 2"/>
+          <p:cNvSpPr>
+            <a:spLocks noGrp="1"/>
+          </p:cNvSpPr>
+          <p:nvPr>
+            <p:ph idx="1"/>
+          </p:nvPr>
+        </p:nvSpPr>
+        <p:spPr/>
+        <p:txBody>
+          <a:bodyPr/>
+          <a:lstStyle/>
+          <a:p>
+            <a:endParaRPr lang="en-US"/>
+          </a:p>
+        </p:txBody>
+      </p:sp>
+      <p:pic>
+        <p:nvPicPr>
+          <p:cNvPr id="2050" name="Picture 2" descr="frente.png"/>
+          <p:cNvPicPr>
+            <a:picLocks noChangeAspect="1" noChangeArrowheads="1"/>
+          </p:cNvPicPr>
+          <p:nvPr/>
+        </p:nvPicPr>
+        <p:blipFill>
+          <a:blip r:embed="rId2">
+            <a:extLst>
+              <a:ext uri="{28A0092B-C50C-407E-A947-70E740481C1C}">
+                <a14:useLocalDpi xmlns:a14="http://schemas.microsoft.com/office/drawing/2010/main" val="0"/>
+              </a:ext>
+            </a:extLst>
+          </a:blip>
+          <a:srcRect/>
+          <a:stretch>
+            <a:fillRect/>
+          </a:stretch>
+        </p:blipFill>
+        <p:spPr bwMode="auto">
+          <a:xfrm>
+            <a:off x="540193" y="1698171"/>
+            <a:ext cx="4435475" cy="4435475"/>
+          </a:xfrm>
+          <a:prstGeom prst="rect">
+            <a:avLst/>
+          </a:prstGeom>
+          <a:noFill/>
+          <a:extLst>
+            <a:ext uri="{909E8E84-426E-40DD-AFC4-6F175D3DCCD1}">
+              <a14:hiddenFill xmlns:a14="http://schemas.microsoft.com/office/drawing/2010/main">
+                <a:solidFill>
+                  <a:srgbClr val="FFFFFF"/>
+                </a:solidFill>
+              </a14:hiddenFill>
+            </a:ext>
+          </a:extLst>
+        </p:spPr>
+      </p:pic>
+      <p:pic>
+        <p:nvPicPr>
+          <p:cNvPr id="2052" name="Picture 4" descr="lado.png"/>
+          <p:cNvPicPr>
+            <a:picLocks noChangeAspect="1" noChangeArrowheads="1"/>
+          </p:cNvPicPr>
+          <p:nvPr/>
+        </p:nvPicPr>
+        <p:blipFill>
+          <a:blip r:embed="rId3">
+            <a:extLst>
+              <a:ext uri="{28A0092B-C50C-407E-A947-70E740481C1C}">
+                <a14:useLocalDpi xmlns:a14="http://schemas.microsoft.com/office/drawing/2010/main" val="0"/>
+              </a:ext>
+            </a:extLst>
+          </a:blip>
+          <a:srcRect/>
+          <a:stretch>
+            <a:fillRect/>
+          </a:stretch>
+        </p:blipFill>
+        <p:spPr bwMode="auto">
+          <a:xfrm>
+            <a:off x="5624558" y="1538514"/>
+            <a:ext cx="4686391" cy="4435475"/>
+          </a:xfrm>
+          <a:prstGeom prst="rect">
+            <a:avLst/>
+          </a:prstGeom>
+          <a:noFill/>
+          <a:extLst>
+            <a:ext uri="{909E8E84-426E-40DD-AFC4-6F175D3DCCD1}">
+              <a14:hiddenFill xmlns:a14="http://schemas.microsoft.com/office/drawing/2010/main">
+                <a:solidFill>
+                  <a:srgbClr val="FFFFFF"/>
+                </a:solidFill>
+              </a14:hiddenFill>
+            </a:ext>
+          </a:extLst>
+        </p:spPr>
+      </p:pic>
+    </p:spTree>
+    <p:extLst>
+      <p:ext uri="{BB962C8B-B14F-4D97-AF65-F5344CB8AC3E}">
+        <p14:creationId xmlns:p14="http://schemas.microsoft.com/office/powerpoint/2010/main" val="1598748664"/>
+      </p:ext>
+    </p:extLst>
+  </p:cSld>
+  <p:clrMapOvr>
+    <a:masterClrMapping/>
+  </p:clrMapOvr>
+</p:sld>
+</file>
+
+<file path=ppt/slides/slide12.xml><?xml version="1.0" encoding="utf-8"?>
+<p:sld xmlns:a="http://schemas.openxmlformats.org/drawingml/2006/main" xmlns:r="http://schemas.openxmlformats.org/officeDocument/2006/relationships" xmlns:p="http://schemas.openxmlformats.org/presentationml/2006/main">
+  <p:cSld>
+    <p:spTree>
+      <p:nvGrpSpPr>
+        <p:cNvPr id="1" name=""/>
+        <p:cNvGrpSpPr/>
+        <p:nvPr/>
+      </p:nvGrpSpPr>
+      <p:grpSpPr>
+        <a:xfrm>
+          <a:off x="0" y="0"/>
+          <a:ext cx="0" cy="0"/>
+          <a:chOff x="0" y="0"/>
+          <a:chExt cx="0" cy="0"/>
+        </a:xfrm>
+      </p:grpSpPr>
+      <p:sp>
+        <p:nvSpPr>
+          <p:cNvPr id="2" name="Título 1"/>
+          <p:cNvSpPr>
+            <a:spLocks noGrp="1"/>
+          </p:cNvSpPr>
+          <p:nvPr>
+            <p:ph type="title"/>
+          </p:nvPr>
+        </p:nvSpPr>
+        <p:spPr>
+          <a:xfrm>
+            <a:off x="773128" y="252549"/>
+            <a:ext cx="10060335" cy="1320800"/>
+          </a:xfrm>
+        </p:spPr>
+        <p:txBody>
+          <a:bodyPr/>
+          <a:lstStyle/>
+          <a:p>
+            <a:r>
+              <a:rPr lang="es-ES" dirty="0" smtClean="0"/>
+              <a:t>Armas (Sombreado y derechos arreglados)</a:t>
+            </a:r>
+            <a:endParaRPr lang="en-US" dirty="0"/>
+          </a:p>
+        </p:txBody>
+      </p:sp>
+      <p:sp>
+        <p:nvSpPr>
+          <p:cNvPr id="3" name="Marcador de contenido 2"/>
+          <p:cNvSpPr>
+            <a:spLocks noGrp="1"/>
+          </p:cNvSpPr>
+          <p:nvPr>
+            <p:ph idx="1"/>
+          </p:nvPr>
+        </p:nvSpPr>
+        <p:spPr>
+          <a:xfrm>
+            <a:off x="876875" y="4958569"/>
+            <a:ext cx="3581157" cy="484791"/>
+          </a:xfrm>
+        </p:spPr>
+        <p:txBody>
+          <a:bodyPr/>
+          <a:lstStyle/>
+          <a:p>
+            <a:r>
+              <a:rPr lang="es-ES" dirty="0" smtClean="0"/>
+              <a:t>Espada numero 2.</a:t>
+            </a:r>
+            <a:endParaRPr lang="en-US" dirty="0"/>
+          </a:p>
+        </p:txBody>
+      </p:sp>
+      <p:pic>
+        <p:nvPicPr>
+          <p:cNvPr id="3074" name="Picture 2" descr="espada2.png"/>
+          <p:cNvPicPr>
+            <a:picLocks noChangeAspect="1" noChangeArrowheads="1"/>
+          </p:cNvPicPr>
+          <p:nvPr/>
+        </p:nvPicPr>
+        <p:blipFill>
+          <a:blip r:embed="rId2">
+            <a:extLst>
+              <a:ext uri="{28A0092B-C50C-407E-A947-70E740481C1C}">
+                <a14:useLocalDpi xmlns:a14="http://schemas.microsoft.com/office/drawing/2010/main" val="0"/>
+              </a:ext>
+            </a:extLst>
+          </a:blip>
+          <a:srcRect/>
+          <a:stretch>
+            <a:fillRect/>
+          </a:stretch>
+        </p:blipFill>
+        <p:spPr bwMode="auto">
+          <a:xfrm>
+            <a:off x="433495" y="1354277"/>
+            <a:ext cx="3433112" cy="3483742"/>
+          </a:xfrm>
+          <a:prstGeom prst="rect">
+            <a:avLst/>
+          </a:prstGeom>
+          <a:noFill/>
+          <a:extLst>
+            <a:ext uri="{909E8E84-426E-40DD-AFC4-6F175D3DCCD1}">
+              <a14:hiddenFill xmlns:a14="http://schemas.microsoft.com/office/drawing/2010/main">
+                <a:solidFill>
+                  <a:srgbClr val="FFFFFF"/>
+                </a:solidFill>
+              </a14:hiddenFill>
+            </a:ext>
+          </a:extLst>
+        </p:spPr>
+      </p:pic>
+      <p:pic>
+        <p:nvPicPr>
+          <p:cNvPr id="3076" name="Picture 4" descr="martillo2.png"/>
+          <p:cNvPicPr>
+            <a:picLocks noChangeAspect="1" noChangeArrowheads="1"/>
+          </p:cNvPicPr>
+          <p:nvPr/>
+        </p:nvPicPr>
+        <p:blipFill>
+          <a:blip r:embed="rId3">
+            <a:extLst>
+              <a:ext uri="{28A0092B-C50C-407E-A947-70E740481C1C}">
+                <a14:useLocalDpi xmlns:a14="http://schemas.microsoft.com/office/drawing/2010/main" val="0"/>
+              </a:ext>
+            </a:extLst>
+          </a:blip>
+          <a:srcRect/>
+          <a:stretch>
+            <a:fillRect/>
+          </a:stretch>
+        </p:blipFill>
+        <p:spPr bwMode="auto">
+          <a:xfrm>
+            <a:off x="8254546" y="1354277"/>
+            <a:ext cx="3627262" cy="3139849"/>
+          </a:xfrm>
+          <a:prstGeom prst="rect">
+            <a:avLst/>
+          </a:prstGeom>
+          <a:noFill/>
+          <a:extLst>
+            <a:ext uri="{909E8E84-426E-40DD-AFC4-6F175D3DCCD1}">
+              <a14:hiddenFill xmlns:a14="http://schemas.microsoft.com/office/drawing/2010/main">
+                <a:solidFill>
+                  <a:srgbClr val="FFFFFF"/>
+                </a:solidFill>
+              </a14:hiddenFill>
+            </a:ext>
+          </a:extLst>
+        </p:spPr>
+      </p:pic>
+      <p:sp>
+        <p:nvSpPr>
+          <p:cNvPr id="6" name="Marcador de contenido 2"/>
+          <p:cNvSpPr txBox="1">
+            <a:spLocks/>
+          </p:cNvSpPr>
+          <p:nvPr/>
+        </p:nvSpPr>
+        <p:spPr>
+          <a:xfrm>
+            <a:off x="8457686" y="4958568"/>
+            <a:ext cx="3581157" cy="484791"/>
+          </a:xfrm>
+          <a:prstGeom prst="rect">
+            <a:avLst/>
+          </a:prstGeom>
+        </p:spPr>
+        <p:txBody>
+          <a:bodyPr vert="horz" lIns="91440" tIns="45720" rIns="91440" bIns="45720" rtlCol="0">
+            <a:normAutofit/>
+          </a:bodyPr>
+          <a:lstStyle>
+            <a:lvl1pPr marL="342900" indent="-342900" algn="l" defTabSz="457200" rtl="0" eaLnBrk="1" latinLnBrk="0" hangingPunct="1">
+              <a:spcBef>
+                <a:spcPts val="1000"/>
+              </a:spcBef>
+              <a:spcAft>
+                <a:spcPts val="0"/>
+              </a:spcAft>
+              <a:buClr>
+                <a:schemeClr val="accent1"/>
+              </a:buClr>
+              <a:buSzPct val="80000"/>
+              <a:buFont typeface="Wingdings 3" charset="2"/>
+              <a:buChar char=""/>
+              <a:defRPr sz="1800" kern="1200">
+                <a:solidFill>
+                  <a:schemeClr val="tx1">
+                    <a:lumMod val="75000"/>
+                    <a:lumOff val="25000"/>
+                  </a:schemeClr>
+                </a:solidFill>
+                <a:latin typeface="+mn-lt"/>
+                <a:ea typeface="+mn-ea"/>
+                <a:cs typeface="+mn-cs"/>
+              </a:defRPr>
+            </a:lvl1pPr>
+            <a:lvl2pPr marL="742950" indent="-285750" algn="l" defTabSz="457200" rtl="0" eaLnBrk="1" latinLnBrk="0" hangingPunct="1">
+              <a:spcBef>
+                <a:spcPts val="1000"/>
+              </a:spcBef>
+              <a:spcAft>
+                <a:spcPts val="0"/>
+              </a:spcAft>
+              <a:buClr>
+                <a:schemeClr val="accent1"/>
+              </a:buClr>
+              <a:buSzPct val="80000"/>
+              <a:buFont typeface="Wingdings 3" charset="2"/>
+              <a:buChar char=""/>
+              <a:defRPr sz="1600" kern="1200">
+                <a:solidFill>
+                  <a:schemeClr val="tx1">
+                    <a:lumMod val="75000"/>
+                    <a:lumOff val="25000"/>
+                  </a:schemeClr>
+                </a:solidFill>
+                <a:latin typeface="+mn-lt"/>
+                <a:ea typeface="+mn-ea"/>
+                <a:cs typeface="+mn-cs"/>
+              </a:defRPr>
+            </a:lvl2pPr>
+            <a:lvl3pPr marL="1143000" indent="-228600" algn="l" defTabSz="457200" rtl="0" eaLnBrk="1" latinLnBrk="0" hangingPunct="1">
+              <a:spcBef>
+                <a:spcPts val="1000"/>
+              </a:spcBef>
+              <a:spcAft>
+                <a:spcPts val="0"/>
+              </a:spcAft>
+              <a:buClr>
+                <a:schemeClr val="accent1"/>
+              </a:buClr>
+              <a:buSzPct val="80000"/>
+              <a:buFont typeface="Wingdings 3" charset="2"/>
+              <a:buChar char=""/>
+              <a:defRPr sz="1400" kern="1200">
+                <a:solidFill>
+                  <a:schemeClr val="tx1">
+                    <a:lumMod val="75000"/>
+                    <a:lumOff val="25000"/>
+                  </a:schemeClr>
+                </a:solidFill>
+                <a:latin typeface="+mn-lt"/>
+                <a:ea typeface="+mn-ea"/>
+                <a:cs typeface="+mn-cs"/>
+              </a:defRPr>
+            </a:lvl3pPr>
+            <a:lvl4pPr marL="1600200" indent="-228600" algn="l" defTabSz="457200" rtl="0" eaLnBrk="1" latinLnBrk="0" hangingPunct="1">
+              <a:spcBef>
+                <a:spcPts val="1000"/>
+              </a:spcBef>
+              <a:spcAft>
+                <a:spcPts val="0"/>
+              </a:spcAft>
+              <a:buClr>
+                <a:schemeClr val="accent1"/>
+              </a:buClr>
+              <a:buSzPct val="80000"/>
+              <a:buFont typeface="Wingdings 3" charset="2"/>
+              <a:buChar char=""/>
+              <a:defRPr sz="1200" kern="1200">
+                <a:solidFill>
+                  <a:schemeClr val="tx1">
+                    <a:lumMod val="75000"/>
+                    <a:lumOff val="25000"/>
+                  </a:schemeClr>
+                </a:solidFill>
+                <a:latin typeface="+mn-lt"/>
+                <a:ea typeface="+mn-ea"/>
+                <a:cs typeface="+mn-cs"/>
+              </a:defRPr>
+            </a:lvl4pPr>
+            <a:lvl5pPr marL="2057400" indent="-228600" algn="l" defTabSz="457200" rtl="0" eaLnBrk="1" latinLnBrk="0" hangingPunct="1">
+              <a:spcBef>
+                <a:spcPts val="1000"/>
+              </a:spcBef>
+              <a:spcAft>
+                <a:spcPts val="0"/>
+              </a:spcAft>
+              <a:buClr>
+                <a:schemeClr val="accent1"/>
+              </a:buClr>
+              <a:buSzPct val="80000"/>
+              <a:buFont typeface="Wingdings 3" charset="2"/>
+              <a:buChar char=""/>
+              <a:defRPr sz="1200" kern="1200">
+                <a:solidFill>
+                  <a:schemeClr val="tx1">
+                    <a:lumMod val="75000"/>
+                    <a:lumOff val="25000"/>
+                  </a:schemeClr>
+                </a:solidFill>
+                <a:latin typeface="+mn-lt"/>
+                <a:ea typeface="+mn-ea"/>
+                <a:cs typeface="+mn-cs"/>
+              </a:defRPr>
+            </a:lvl5pPr>
+            <a:lvl6pPr marL="2514600" indent="-228600" algn="l" defTabSz="457200" rtl="0" eaLnBrk="1" latinLnBrk="0" hangingPunct="1">
+              <a:spcBef>
+                <a:spcPts val="1000"/>
+              </a:spcBef>
+              <a:spcAft>
+                <a:spcPts val="0"/>
+              </a:spcAft>
+              <a:buClr>
+                <a:schemeClr val="accent1"/>
+              </a:buClr>
+              <a:buSzPct val="80000"/>
+              <a:buFont typeface="Wingdings 3" charset="2"/>
+              <a:buChar char=""/>
+              <a:defRPr sz="1200" kern="1200">
+                <a:solidFill>
+                  <a:schemeClr val="tx1">
+                    <a:lumMod val="75000"/>
+                    <a:lumOff val="25000"/>
+                  </a:schemeClr>
+                </a:solidFill>
+                <a:latin typeface="+mn-lt"/>
+                <a:ea typeface="+mn-ea"/>
+                <a:cs typeface="+mn-cs"/>
+              </a:defRPr>
+            </a:lvl6pPr>
+            <a:lvl7pPr marL="2971800" indent="-228600" algn="l" defTabSz="457200" rtl="0" eaLnBrk="1" latinLnBrk="0" hangingPunct="1">
+              <a:spcBef>
+                <a:spcPts val="1000"/>
+              </a:spcBef>
+              <a:spcAft>
+                <a:spcPts val="0"/>
+              </a:spcAft>
+              <a:buClr>
+                <a:schemeClr val="accent1"/>
+              </a:buClr>
+              <a:buSzPct val="80000"/>
+              <a:buFont typeface="Wingdings 3" charset="2"/>
+              <a:buChar char=""/>
+              <a:defRPr sz="1200" kern="1200">
+                <a:solidFill>
+                  <a:schemeClr val="tx1">
+                    <a:lumMod val="75000"/>
+                    <a:lumOff val="25000"/>
+                  </a:schemeClr>
+                </a:solidFill>
+                <a:latin typeface="+mn-lt"/>
+                <a:ea typeface="+mn-ea"/>
+                <a:cs typeface="+mn-cs"/>
+              </a:defRPr>
+            </a:lvl7pPr>
+            <a:lvl8pPr marL="3429000" indent="-228600" algn="l" defTabSz="457200" rtl="0" eaLnBrk="1" latinLnBrk="0" hangingPunct="1">
+              <a:spcBef>
+                <a:spcPts val="1000"/>
+              </a:spcBef>
+              <a:spcAft>
+                <a:spcPts val="0"/>
+              </a:spcAft>
+              <a:buClr>
+                <a:schemeClr val="accent1"/>
+              </a:buClr>
+              <a:buSzPct val="80000"/>
+              <a:buFont typeface="Wingdings 3" charset="2"/>
+              <a:buChar char=""/>
+              <a:defRPr sz="1200" kern="1200">
+                <a:solidFill>
+                  <a:schemeClr val="tx1">
+                    <a:lumMod val="75000"/>
+                    <a:lumOff val="25000"/>
+                  </a:schemeClr>
+                </a:solidFill>
+                <a:latin typeface="+mn-lt"/>
+                <a:ea typeface="+mn-ea"/>
+                <a:cs typeface="+mn-cs"/>
+              </a:defRPr>
+            </a:lvl8pPr>
+            <a:lvl9pPr marL="3886200" indent="-228600" algn="l" defTabSz="457200" rtl="0" eaLnBrk="1" latinLnBrk="0" hangingPunct="1">
+              <a:spcBef>
+                <a:spcPts val="1000"/>
+              </a:spcBef>
+              <a:spcAft>
+                <a:spcPts val="0"/>
+              </a:spcAft>
+              <a:buClr>
+                <a:schemeClr val="accent1"/>
+              </a:buClr>
+              <a:buSzPct val="80000"/>
+              <a:buFont typeface="Wingdings 3" charset="2"/>
+              <a:buChar char=""/>
+              <a:defRPr sz="1200" kern="1200">
+                <a:solidFill>
+                  <a:schemeClr val="tx1">
+                    <a:lumMod val="75000"/>
+                    <a:lumOff val="25000"/>
+                  </a:schemeClr>
+                </a:solidFill>
+                <a:latin typeface="+mn-lt"/>
+                <a:ea typeface="+mn-ea"/>
+                <a:cs typeface="+mn-cs"/>
+              </a:defRPr>
+            </a:lvl9pPr>
+          </a:lstStyle>
+          <a:p>
+            <a:r>
+              <a:rPr lang="es-ES" dirty="0" smtClean="0"/>
+              <a:t>Martillo numero 2.</a:t>
+            </a:r>
+            <a:endParaRPr lang="en-US" dirty="0"/>
+          </a:p>
+        </p:txBody>
+      </p:sp>
+      <p:pic>
+        <p:nvPicPr>
+          <p:cNvPr id="3078" name="Picture 6" descr="inicial2.png"/>
+          <p:cNvPicPr>
+            <a:picLocks noChangeAspect="1" noChangeArrowheads="1"/>
+          </p:cNvPicPr>
+          <p:nvPr/>
+        </p:nvPicPr>
+        <p:blipFill>
+          <a:blip r:embed="rId4">
+            <a:extLst>
+              <a:ext uri="{28A0092B-C50C-407E-A947-70E740481C1C}">
+                <a14:useLocalDpi xmlns:a14="http://schemas.microsoft.com/office/drawing/2010/main" val="0"/>
+              </a:ext>
+            </a:extLst>
+          </a:blip>
+          <a:srcRect/>
+          <a:stretch>
+            <a:fillRect/>
+          </a:stretch>
+        </p:blipFill>
+        <p:spPr bwMode="auto">
+          <a:xfrm>
+            <a:off x="4023362" y="2176946"/>
+            <a:ext cx="3143793" cy="2721346"/>
+          </a:xfrm>
+          <a:prstGeom prst="rect">
+            <a:avLst/>
+          </a:prstGeom>
+          <a:noFill/>
+          <a:extLst>
+            <a:ext uri="{909E8E84-426E-40DD-AFC4-6F175D3DCCD1}">
+              <a14:hiddenFill xmlns:a14="http://schemas.microsoft.com/office/drawing/2010/main">
+                <a:solidFill>
+                  <a:srgbClr val="FFFFFF"/>
+                </a:solidFill>
+              </a14:hiddenFill>
+            </a:ext>
+          </a:extLst>
+        </p:spPr>
+      </p:pic>
+      <p:sp>
+        <p:nvSpPr>
+          <p:cNvPr id="8" name="Marcador de contenido 2"/>
+          <p:cNvSpPr txBox="1">
+            <a:spLocks/>
+          </p:cNvSpPr>
+          <p:nvPr/>
+        </p:nvSpPr>
+        <p:spPr>
+          <a:xfrm>
+            <a:off x="4466742" y="4958567"/>
+            <a:ext cx="3581157" cy="484791"/>
+          </a:xfrm>
+          <a:prstGeom prst="rect">
+            <a:avLst/>
+          </a:prstGeom>
+        </p:spPr>
+        <p:txBody>
+          <a:bodyPr vert="horz" lIns="91440" tIns="45720" rIns="91440" bIns="45720" rtlCol="0">
+            <a:normAutofit/>
+          </a:bodyPr>
+          <a:lstStyle>
+            <a:lvl1pPr marL="342900" indent="-342900" algn="l" defTabSz="457200" rtl="0" eaLnBrk="1" latinLnBrk="0" hangingPunct="1">
+              <a:spcBef>
+                <a:spcPts val="1000"/>
+              </a:spcBef>
+              <a:spcAft>
+                <a:spcPts val="0"/>
+              </a:spcAft>
+              <a:buClr>
+                <a:schemeClr val="accent1"/>
+              </a:buClr>
+              <a:buSzPct val="80000"/>
+              <a:buFont typeface="Wingdings 3" charset="2"/>
+              <a:buChar char=""/>
+              <a:defRPr sz="1800" kern="1200">
+                <a:solidFill>
+                  <a:schemeClr val="tx1">
+                    <a:lumMod val="75000"/>
+                    <a:lumOff val="25000"/>
+                  </a:schemeClr>
+                </a:solidFill>
+                <a:latin typeface="+mn-lt"/>
+                <a:ea typeface="+mn-ea"/>
+                <a:cs typeface="+mn-cs"/>
+              </a:defRPr>
+            </a:lvl1pPr>
+            <a:lvl2pPr marL="742950" indent="-285750" algn="l" defTabSz="457200" rtl="0" eaLnBrk="1" latinLnBrk="0" hangingPunct="1">
+              <a:spcBef>
+                <a:spcPts val="1000"/>
+              </a:spcBef>
+              <a:spcAft>
+                <a:spcPts val="0"/>
+              </a:spcAft>
+              <a:buClr>
+                <a:schemeClr val="accent1"/>
+              </a:buClr>
+              <a:buSzPct val="80000"/>
+              <a:buFont typeface="Wingdings 3" charset="2"/>
+              <a:buChar char=""/>
+              <a:defRPr sz="1600" kern="1200">
+                <a:solidFill>
+                  <a:schemeClr val="tx1">
+                    <a:lumMod val="75000"/>
+                    <a:lumOff val="25000"/>
+                  </a:schemeClr>
+                </a:solidFill>
+                <a:latin typeface="+mn-lt"/>
+                <a:ea typeface="+mn-ea"/>
+                <a:cs typeface="+mn-cs"/>
+              </a:defRPr>
+            </a:lvl2pPr>
+            <a:lvl3pPr marL="1143000" indent="-228600" algn="l" defTabSz="457200" rtl="0" eaLnBrk="1" latinLnBrk="0" hangingPunct="1">
+              <a:spcBef>
+                <a:spcPts val="1000"/>
+              </a:spcBef>
+              <a:spcAft>
+                <a:spcPts val="0"/>
+              </a:spcAft>
+              <a:buClr>
+                <a:schemeClr val="accent1"/>
+              </a:buClr>
+              <a:buSzPct val="80000"/>
+              <a:buFont typeface="Wingdings 3" charset="2"/>
+              <a:buChar char=""/>
+              <a:defRPr sz="1400" kern="1200">
+                <a:solidFill>
+                  <a:schemeClr val="tx1">
+                    <a:lumMod val="75000"/>
+                    <a:lumOff val="25000"/>
+                  </a:schemeClr>
+                </a:solidFill>
+                <a:latin typeface="+mn-lt"/>
+                <a:ea typeface="+mn-ea"/>
+                <a:cs typeface="+mn-cs"/>
+              </a:defRPr>
+            </a:lvl3pPr>
+            <a:lvl4pPr marL="1600200" indent="-228600" algn="l" defTabSz="457200" rtl="0" eaLnBrk="1" latinLnBrk="0" hangingPunct="1">
+              <a:spcBef>
+                <a:spcPts val="1000"/>
+              </a:spcBef>
+              <a:spcAft>
+                <a:spcPts val="0"/>
+              </a:spcAft>
+              <a:buClr>
+                <a:schemeClr val="accent1"/>
+              </a:buClr>
+              <a:buSzPct val="80000"/>
+              <a:buFont typeface="Wingdings 3" charset="2"/>
+              <a:buChar char=""/>
+              <a:defRPr sz="1200" kern="1200">
+                <a:solidFill>
+                  <a:schemeClr val="tx1">
+                    <a:lumMod val="75000"/>
+                    <a:lumOff val="25000"/>
+                  </a:schemeClr>
+                </a:solidFill>
+                <a:latin typeface="+mn-lt"/>
+                <a:ea typeface="+mn-ea"/>
+                <a:cs typeface="+mn-cs"/>
+              </a:defRPr>
+            </a:lvl4pPr>
+            <a:lvl5pPr marL="2057400" indent="-228600" algn="l" defTabSz="457200" rtl="0" eaLnBrk="1" latinLnBrk="0" hangingPunct="1">
+              <a:spcBef>
+                <a:spcPts val="1000"/>
+              </a:spcBef>
+              <a:spcAft>
+                <a:spcPts val="0"/>
+              </a:spcAft>
+              <a:buClr>
+                <a:schemeClr val="accent1"/>
+              </a:buClr>
+              <a:buSzPct val="80000"/>
+              <a:buFont typeface="Wingdings 3" charset="2"/>
+              <a:buChar char=""/>
+              <a:defRPr sz="1200" kern="1200">
+                <a:solidFill>
+                  <a:schemeClr val="tx1">
+                    <a:lumMod val="75000"/>
+                    <a:lumOff val="25000"/>
+                  </a:schemeClr>
+                </a:solidFill>
+                <a:latin typeface="+mn-lt"/>
+                <a:ea typeface="+mn-ea"/>
+                <a:cs typeface="+mn-cs"/>
+              </a:defRPr>
+            </a:lvl5pPr>
+            <a:lvl6pPr marL="2514600" indent="-228600" algn="l" defTabSz="457200" rtl="0" eaLnBrk="1" latinLnBrk="0" hangingPunct="1">
+              <a:spcBef>
+                <a:spcPts val="1000"/>
+              </a:spcBef>
+              <a:spcAft>
+                <a:spcPts val="0"/>
+              </a:spcAft>
+              <a:buClr>
+                <a:schemeClr val="accent1"/>
+              </a:buClr>
+              <a:buSzPct val="80000"/>
+              <a:buFont typeface="Wingdings 3" charset="2"/>
+              <a:buChar char=""/>
+              <a:defRPr sz="1200" kern="1200">
+                <a:solidFill>
+                  <a:schemeClr val="tx1">
+                    <a:lumMod val="75000"/>
+                    <a:lumOff val="25000"/>
+                  </a:schemeClr>
+                </a:solidFill>
+                <a:latin typeface="+mn-lt"/>
+                <a:ea typeface="+mn-ea"/>
+                <a:cs typeface="+mn-cs"/>
+              </a:defRPr>
+            </a:lvl6pPr>
+            <a:lvl7pPr marL="2971800" indent="-228600" algn="l" defTabSz="457200" rtl="0" eaLnBrk="1" latinLnBrk="0" hangingPunct="1">
+              <a:spcBef>
+                <a:spcPts val="1000"/>
+              </a:spcBef>
+              <a:spcAft>
+                <a:spcPts val="0"/>
+              </a:spcAft>
+              <a:buClr>
+                <a:schemeClr val="accent1"/>
+              </a:buClr>
+              <a:buSzPct val="80000"/>
+              <a:buFont typeface="Wingdings 3" charset="2"/>
+              <a:buChar char=""/>
+              <a:defRPr sz="1200" kern="1200">
+                <a:solidFill>
+                  <a:schemeClr val="tx1">
+                    <a:lumMod val="75000"/>
+                    <a:lumOff val="25000"/>
+                  </a:schemeClr>
+                </a:solidFill>
+                <a:latin typeface="+mn-lt"/>
+                <a:ea typeface="+mn-ea"/>
+                <a:cs typeface="+mn-cs"/>
+              </a:defRPr>
+            </a:lvl7pPr>
+            <a:lvl8pPr marL="3429000" indent="-228600" algn="l" defTabSz="457200" rtl="0" eaLnBrk="1" latinLnBrk="0" hangingPunct="1">
+              <a:spcBef>
+                <a:spcPts val="1000"/>
+              </a:spcBef>
+              <a:spcAft>
+                <a:spcPts val="0"/>
+              </a:spcAft>
+              <a:buClr>
+                <a:schemeClr val="accent1"/>
+              </a:buClr>
+              <a:buSzPct val="80000"/>
+              <a:buFont typeface="Wingdings 3" charset="2"/>
+              <a:buChar char=""/>
+              <a:defRPr sz="1200" kern="1200">
+                <a:solidFill>
+                  <a:schemeClr val="tx1">
+                    <a:lumMod val="75000"/>
+                    <a:lumOff val="25000"/>
+                  </a:schemeClr>
+                </a:solidFill>
+                <a:latin typeface="+mn-lt"/>
+                <a:ea typeface="+mn-ea"/>
+                <a:cs typeface="+mn-cs"/>
+              </a:defRPr>
+            </a:lvl8pPr>
+            <a:lvl9pPr marL="3886200" indent="-228600" algn="l" defTabSz="457200" rtl="0" eaLnBrk="1" latinLnBrk="0" hangingPunct="1">
+              <a:spcBef>
+                <a:spcPts val="1000"/>
+              </a:spcBef>
+              <a:spcAft>
+                <a:spcPts val="0"/>
+              </a:spcAft>
+              <a:buClr>
+                <a:schemeClr val="accent1"/>
+              </a:buClr>
+              <a:buSzPct val="80000"/>
+              <a:buFont typeface="Wingdings 3" charset="2"/>
+              <a:buChar char=""/>
+              <a:defRPr sz="1200" kern="1200">
+                <a:solidFill>
+                  <a:schemeClr val="tx1">
+                    <a:lumMod val="75000"/>
+                    <a:lumOff val="25000"/>
+                  </a:schemeClr>
+                </a:solidFill>
+                <a:latin typeface="+mn-lt"/>
+                <a:ea typeface="+mn-ea"/>
+                <a:cs typeface="+mn-cs"/>
+              </a:defRPr>
+            </a:lvl9pPr>
+          </a:lstStyle>
+          <a:p>
+            <a:r>
+              <a:rPr lang="es-ES" dirty="0" smtClean="0"/>
+              <a:t>Arma inicial.</a:t>
+            </a:r>
+            <a:endParaRPr lang="en-US" dirty="0"/>
+          </a:p>
+        </p:txBody>
+      </p:sp>
+    </p:spTree>
+    <p:extLst>
+      <p:ext uri="{BB962C8B-B14F-4D97-AF65-F5344CB8AC3E}">
+        <p14:creationId xmlns:p14="http://schemas.microsoft.com/office/powerpoint/2010/main" val="3048267696"/>
+      </p:ext>
+    </p:extLst>
+  </p:cSld>
+  <p:clrMapOvr>
+    <a:masterClrMapping/>
+  </p:clrMapOvr>
+</p:sld>
+</file>
+
+<file path=ppt/slides/slide13.xml><?xml version="1.0" encoding="utf-8"?>
+<p:sld xmlns:a="http://schemas.openxmlformats.org/drawingml/2006/main" xmlns:r="http://schemas.openxmlformats.org/officeDocument/2006/relationships" xmlns:p="http://schemas.openxmlformats.org/presentationml/2006/main">
+  <p:cSld>
+    <p:spTree>
+      <p:nvGrpSpPr>
+        <p:cNvPr id="1" name=""/>
+        <p:cNvGrpSpPr/>
+        <p:nvPr/>
+      </p:nvGrpSpPr>
+      <p:grpSpPr>
+        <a:xfrm>
+          <a:off x="0" y="0"/>
+          <a:ext cx="0" cy="0"/>
+          <a:chOff x="0" y="0"/>
+          <a:chExt cx="0" cy="0"/>
+        </a:xfrm>
+      </p:grpSpPr>
+      <p:sp>
+        <p:nvSpPr>
+          <p:cNvPr id="2" name="Título 1"/>
+          <p:cNvSpPr>
+            <a:spLocks noGrp="1"/>
+          </p:cNvSpPr>
+          <p:nvPr>
+            <p:ph type="title"/>
+          </p:nvPr>
+        </p:nvSpPr>
+        <p:spPr>
+          <a:xfrm>
+            <a:off x="3664374" y="235131"/>
+            <a:ext cx="8596668" cy="1320800"/>
+          </a:xfrm>
+        </p:spPr>
+        <p:txBody>
+          <a:bodyPr/>
+          <a:lstStyle/>
+          <a:p>
+            <a:r>
+              <a:rPr lang="es-ES" dirty="0" smtClean="0"/>
+              <a:t>Enemigos</a:t>
+            </a:r>
+            <a:endParaRPr lang="en-US" dirty="0"/>
+          </a:p>
+        </p:txBody>
+      </p:sp>
+      <p:sp>
+        <p:nvSpPr>
+          <p:cNvPr id="3" name="Marcador de contenido 2"/>
+          <p:cNvSpPr>
+            <a:spLocks noGrp="1"/>
+          </p:cNvSpPr>
+          <p:nvPr>
+            <p:ph idx="1"/>
+          </p:nvPr>
+        </p:nvSpPr>
+        <p:spPr>
+          <a:xfrm>
+            <a:off x="294158" y="4589417"/>
+            <a:ext cx="3798872" cy="2636311"/>
+          </a:xfrm>
+        </p:spPr>
+        <p:txBody>
+          <a:bodyPr/>
+          <a:lstStyle/>
+          <a:p>
+            <a:r>
+              <a:rPr lang="es-ES" dirty="0" smtClean="0"/>
+              <a:t>Enemigo nivel 1.</a:t>
+            </a:r>
+            <a:endParaRPr lang="en-US" dirty="0"/>
+          </a:p>
+        </p:txBody>
+      </p:sp>
+      <p:pic>
+        <p:nvPicPr>
+          <p:cNvPr id="4098" name="Picture 2" descr="slime lvl1.png"/>
+          <p:cNvPicPr>
+            <a:picLocks noChangeAspect="1" noChangeArrowheads="1"/>
+          </p:cNvPicPr>
+          <p:nvPr/>
+        </p:nvPicPr>
+        <p:blipFill>
+          <a:blip r:embed="rId2">
+            <a:extLst>
+              <a:ext uri="{28A0092B-C50C-407E-A947-70E740481C1C}">
+                <a14:useLocalDpi xmlns:a14="http://schemas.microsoft.com/office/drawing/2010/main" val="0"/>
+              </a:ext>
+            </a:extLst>
+          </a:blip>
+          <a:srcRect/>
+          <a:stretch>
+            <a:fillRect/>
+          </a:stretch>
+        </p:blipFill>
+        <p:spPr bwMode="auto">
+          <a:xfrm>
+            <a:off x="416258" y="1639614"/>
+            <a:ext cx="2949803" cy="2949803"/>
+          </a:xfrm>
+          <a:prstGeom prst="rect">
+            <a:avLst/>
+          </a:prstGeom>
+          <a:noFill/>
+          <a:extLst>
+            <a:ext uri="{909E8E84-426E-40DD-AFC4-6F175D3DCCD1}">
+              <a14:hiddenFill xmlns:a14="http://schemas.microsoft.com/office/drawing/2010/main">
+                <a:solidFill>
+                  <a:srgbClr val="FFFFFF"/>
+                </a:solidFill>
+              </a14:hiddenFill>
+            </a:ext>
+          </a:extLst>
+        </p:spPr>
+      </p:pic>
+      <p:pic>
+        <p:nvPicPr>
+          <p:cNvPr id="4100" name="Picture 4" descr="slime lvl2.png"/>
+          <p:cNvPicPr>
+            <a:picLocks noChangeAspect="1" noChangeArrowheads="1"/>
+          </p:cNvPicPr>
+          <p:nvPr/>
+        </p:nvPicPr>
+        <p:blipFill>
+          <a:blip r:embed="rId3">
+            <a:extLst>
+              <a:ext uri="{28A0092B-C50C-407E-A947-70E740481C1C}">
+                <a14:useLocalDpi xmlns:a14="http://schemas.microsoft.com/office/drawing/2010/main" val="0"/>
+              </a:ext>
+            </a:extLst>
+          </a:blip>
+          <a:srcRect/>
+          <a:stretch>
+            <a:fillRect/>
+          </a:stretch>
+        </p:blipFill>
+        <p:spPr bwMode="auto">
+          <a:xfrm>
+            <a:off x="3481497" y="1131712"/>
+            <a:ext cx="3790161" cy="3790161"/>
+          </a:xfrm>
+          <a:prstGeom prst="rect">
+            <a:avLst/>
+          </a:prstGeom>
+          <a:noFill/>
+          <a:extLst>
+            <a:ext uri="{909E8E84-426E-40DD-AFC4-6F175D3DCCD1}">
+              <a14:hiddenFill xmlns:a14="http://schemas.microsoft.com/office/drawing/2010/main">
+                <a:solidFill>
+                  <a:srgbClr val="FFFFFF"/>
+                </a:solidFill>
+              </a14:hiddenFill>
+            </a:ext>
+          </a:extLst>
+        </p:spPr>
+      </p:pic>
+      <p:sp>
+        <p:nvSpPr>
+          <p:cNvPr id="6" name="Marcador de contenido 2"/>
+          <p:cNvSpPr txBox="1">
+            <a:spLocks/>
+          </p:cNvSpPr>
+          <p:nvPr/>
+        </p:nvSpPr>
+        <p:spPr>
+          <a:xfrm>
+            <a:off x="3886443" y="4589417"/>
+            <a:ext cx="3798872" cy="2636311"/>
+          </a:xfrm>
+          <a:prstGeom prst="rect">
+            <a:avLst/>
+          </a:prstGeom>
+        </p:spPr>
+        <p:txBody>
+          <a:bodyPr vert="horz" lIns="91440" tIns="45720" rIns="91440" bIns="45720" rtlCol="0">
+            <a:normAutofit/>
+          </a:bodyPr>
+          <a:lstStyle>
+            <a:lvl1pPr marL="342900" indent="-342900" algn="l" defTabSz="457200" rtl="0" eaLnBrk="1" latinLnBrk="0" hangingPunct="1">
+              <a:spcBef>
+                <a:spcPts val="1000"/>
+              </a:spcBef>
+              <a:spcAft>
+                <a:spcPts val="0"/>
+              </a:spcAft>
+              <a:buClr>
+                <a:schemeClr val="accent1"/>
+              </a:buClr>
+              <a:buSzPct val="80000"/>
+              <a:buFont typeface="Wingdings 3" charset="2"/>
+              <a:buChar char=""/>
+              <a:defRPr sz="1800" kern="1200">
+                <a:solidFill>
+                  <a:schemeClr val="tx1">
+                    <a:lumMod val="75000"/>
+                    <a:lumOff val="25000"/>
+                  </a:schemeClr>
+                </a:solidFill>
+                <a:latin typeface="+mn-lt"/>
+                <a:ea typeface="+mn-ea"/>
+                <a:cs typeface="+mn-cs"/>
+              </a:defRPr>
+            </a:lvl1pPr>
+            <a:lvl2pPr marL="742950" indent="-285750" algn="l" defTabSz="457200" rtl="0" eaLnBrk="1" latinLnBrk="0" hangingPunct="1">
+              <a:spcBef>
+                <a:spcPts val="1000"/>
+              </a:spcBef>
+              <a:spcAft>
+                <a:spcPts val="0"/>
+              </a:spcAft>
+              <a:buClr>
+                <a:schemeClr val="accent1"/>
+              </a:buClr>
+              <a:buSzPct val="80000"/>
+              <a:buFont typeface="Wingdings 3" charset="2"/>
+              <a:buChar char=""/>
+              <a:defRPr sz="1600" kern="1200">
+                <a:solidFill>
+                  <a:schemeClr val="tx1">
+                    <a:lumMod val="75000"/>
+                    <a:lumOff val="25000"/>
+                  </a:schemeClr>
+                </a:solidFill>
+                <a:latin typeface="+mn-lt"/>
+                <a:ea typeface="+mn-ea"/>
+                <a:cs typeface="+mn-cs"/>
+              </a:defRPr>
+            </a:lvl2pPr>
+            <a:lvl3pPr marL="1143000" indent="-228600" algn="l" defTabSz="457200" rtl="0" eaLnBrk="1" latinLnBrk="0" hangingPunct="1">
+              <a:spcBef>
+                <a:spcPts val="1000"/>
+              </a:spcBef>
+              <a:spcAft>
+                <a:spcPts val="0"/>
+              </a:spcAft>
+              <a:buClr>
+                <a:schemeClr val="accent1"/>
+              </a:buClr>
+              <a:buSzPct val="80000"/>
+              <a:buFont typeface="Wingdings 3" charset="2"/>
+              <a:buChar char=""/>
+              <a:defRPr sz="1400" kern="1200">
+                <a:solidFill>
+                  <a:schemeClr val="tx1">
+                    <a:lumMod val="75000"/>
+                    <a:lumOff val="25000"/>
+                  </a:schemeClr>
+                </a:solidFill>
+                <a:latin typeface="+mn-lt"/>
+                <a:ea typeface="+mn-ea"/>
+                <a:cs typeface="+mn-cs"/>
+              </a:defRPr>
+            </a:lvl3pPr>
+            <a:lvl4pPr marL="1600200" indent="-228600" algn="l" defTabSz="457200" rtl="0" eaLnBrk="1" latinLnBrk="0" hangingPunct="1">
+              <a:spcBef>
+                <a:spcPts val="1000"/>
+              </a:spcBef>
+              <a:spcAft>
+                <a:spcPts val="0"/>
+              </a:spcAft>
+              <a:buClr>
+                <a:schemeClr val="accent1"/>
+              </a:buClr>
+              <a:buSzPct val="80000"/>
+              <a:buFont typeface="Wingdings 3" charset="2"/>
+              <a:buChar char=""/>
+              <a:defRPr sz="1200" kern="1200">
+                <a:solidFill>
+                  <a:schemeClr val="tx1">
+                    <a:lumMod val="75000"/>
+                    <a:lumOff val="25000"/>
+                  </a:schemeClr>
+                </a:solidFill>
+                <a:latin typeface="+mn-lt"/>
+                <a:ea typeface="+mn-ea"/>
+                <a:cs typeface="+mn-cs"/>
+              </a:defRPr>
+            </a:lvl4pPr>
+            <a:lvl5pPr marL="2057400" indent="-228600" algn="l" defTabSz="457200" rtl="0" eaLnBrk="1" latinLnBrk="0" hangingPunct="1">
+              <a:spcBef>
+                <a:spcPts val="1000"/>
+              </a:spcBef>
+              <a:spcAft>
+                <a:spcPts val="0"/>
+              </a:spcAft>
+              <a:buClr>
+                <a:schemeClr val="accent1"/>
+              </a:buClr>
+              <a:buSzPct val="80000"/>
+              <a:buFont typeface="Wingdings 3" charset="2"/>
+              <a:buChar char=""/>
+              <a:defRPr sz="1200" kern="1200">
+                <a:solidFill>
+                  <a:schemeClr val="tx1">
+                    <a:lumMod val="75000"/>
+                    <a:lumOff val="25000"/>
+                  </a:schemeClr>
+                </a:solidFill>
+                <a:latin typeface="+mn-lt"/>
+                <a:ea typeface="+mn-ea"/>
+                <a:cs typeface="+mn-cs"/>
+              </a:defRPr>
+            </a:lvl5pPr>
+            <a:lvl6pPr marL="2514600" indent="-228600" algn="l" defTabSz="457200" rtl="0" eaLnBrk="1" latinLnBrk="0" hangingPunct="1">
+              <a:spcBef>
+                <a:spcPts val="1000"/>
+              </a:spcBef>
+              <a:spcAft>
+                <a:spcPts val="0"/>
+              </a:spcAft>
+              <a:buClr>
+                <a:schemeClr val="accent1"/>
+              </a:buClr>
+              <a:buSzPct val="80000"/>
+              <a:buFont typeface="Wingdings 3" charset="2"/>
+              <a:buChar char=""/>
+              <a:defRPr sz="1200" kern="1200">
+                <a:solidFill>
+                  <a:schemeClr val="tx1">
+                    <a:lumMod val="75000"/>
+                    <a:lumOff val="25000"/>
+                  </a:schemeClr>
+                </a:solidFill>
+                <a:latin typeface="+mn-lt"/>
+                <a:ea typeface="+mn-ea"/>
+                <a:cs typeface="+mn-cs"/>
+              </a:defRPr>
+            </a:lvl6pPr>
+            <a:lvl7pPr marL="2971800" indent="-228600" algn="l" defTabSz="457200" rtl="0" eaLnBrk="1" latinLnBrk="0" hangingPunct="1">
+              <a:spcBef>
+                <a:spcPts val="1000"/>
+              </a:spcBef>
+              <a:spcAft>
+                <a:spcPts val="0"/>
+              </a:spcAft>
+              <a:buClr>
+                <a:schemeClr val="accent1"/>
+              </a:buClr>
+              <a:buSzPct val="80000"/>
+              <a:buFont typeface="Wingdings 3" charset="2"/>
+              <a:buChar char=""/>
+              <a:defRPr sz="1200" kern="1200">
+                <a:solidFill>
+                  <a:schemeClr val="tx1">
+                    <a:lumMod val="75000"/>
+                    <a:lumOff val="25000"/>
+                  </a:schemeClr>
+                </a:solidFill>
+                <a:latin typeface="+mn-lt"/>
+                <a:ea typeface="+mn-ea"/>
+                <a:cs typeface="+mn-cs"/>
+              </a:defRPr>
+            </a:lvl7pPr>
+            <a:lvl8pPr marL="3429000" indent="-228600" algn="l" defTabSz="457200" rtl="0" eaLnBrk="1" latinLnBrk="0" hangingPunct="1">
+              <a:spcBef>
+                <a:spcPts val="1000"/>
+              </a:spcBef>
+              <a:spcAft>
+                <a:spcPts val="0"/>
+              </a:spcAft>
+              <a:buClr>
+                <a:schemeClr val="accent1"/>
+              </a:buClr>
+              <a:buSzPct val="80000"/>
+              <a:buFont typeface="Wingdings 3" charset="2"/>
+              <a:buChar char=""/>
+              <a:defRPr sz="1200" kern="1200">
+                <a:solidFill>
+                  <a:schemeClr val="tx1">
+                    <a:lumMod val="75000"/>
+                    <a:lumOff val="25000"/>
+                  </a:schemeClr>
+                </a:solidFill>
+                <a:latin typeface="+mn-lt"/>
+                <a:ea typeface="+mn-ea"/>
+                <a:cs typeface="+mn-cs"/>
+              </a:defRPr>
+            </a:lvl8pPr>
+            <a:lvl9pPr marL="3886200" indent="-228600" algn="l" defTabSz="457200" rtl="0" eaLnBrk="1" latinLnBrk="0" hangingPunct="1">
+              <a:spcBef>
+                <a:spcPts val="1000"/>
+              </a:spcBef>
+              <a:spcAft>
+                <a:spcPts val="0"/>
+              </a:spcAft>
+              <a:buClr>
+                <a:schemeClr val="accent1"/>
+              </a:buClr>
+              <a:buSzPct val="80000"/>
+              <a:buFont typeface="Wingdings 3" charset="2"/>
+              <a:buChar char=""/>
+              <a:defRPr sz="1200" kern="1200">
+                <a:solidFill>
+                  <a:schemeClr val="tx1">
+                    <a:lumMod val="75000"/>
+                    <a:lumOff val="25000"/>
+                  </a:schemeClr>
+                </a:solidFill>
+                <a:latin typeface="+mn-lt"/>
+                <a:ea typeface="+mn-ea"/>
+                <a:cs typeface="+mn-cs"/>
+              </a:defRPr>
+            </a:lvl9pPr>
+          </a:lstStyle>
+          <a:p>
+            <a:r>
+              <a:rPr lang="es-ES" dirty="0" smtClean="0"/>
+              <a:t>Enemigo nivel 2.</a:t>
+            </a:r>
+            <a:endParaRPr lang="en-US" dirty="0"/>
+          </a:p>
+        </p:txBody>
+      </p:sp>
+      <p:pic>
+        <p:nvPicPr>
+          <p:cNvPr id="4102" name="Picture 6" descr="rey.png"/>
+          <p:cNvPicPr>
+            <a:picLocks noChangeAspect="1" noChangeArrowheads="1"/>
+          </p:cNvPicPr>
+          <p:nvPr/>
+        </p:nvPicPr>
+        <p:blipFill>
+          <a:blip r:embed="rId4">
+            <a:extLst>
+              <a:ext uri="{28A0092B-C50C-407E-A947-70E740481C1C}">
+                <a14:useLocalDpi xmlns:a14="http://schemas.microsoft.com/office/drawing/2010/main" val="0"/>
+              </a:ext>
+            </a:extLst>
+          </a:blip>
+          <a:srcRect/>
+          <a:stretch>
+            <a:fillRect/>
+          </a:stretch>
+        </p:blipFill>
+        <p:spPr bwMode="auto">
+          <a:xfrm>
+            <a:off x="7280369" y="235131"/>
+            <a:ext cx="4472482" cy="4472482"/>
+          </a:xfrm>
+          <a:prstGeom prst="rect">
+            <a:avLst/>
+          </a:prstGeom>
+          <a:noFill/>
+          <a:extLst>
+            <a:ext uri="{909E8E84-426E-40DD-AFC4-6F175D3DCCD1}">
+              <a14:hiddenFill xmlns:a14="http://schemas.microsoft.com/office/drawing/2010/main">
+                <a:solidFill>
+                  <a:srgbClr val="FFFFFF"/>
+                </a:solidFill>
+              </a14:hiddenFill>
+            </a:ext>
+          </a:extLst>
+        </p:spPr>
+      </p:pic>
+      <p:sp>
+        <p:nvSpPr>
+          <p:cNvPr id="8" name="Marcador de contenido 2"/>
+          <p:cNvSpPr txBox="1">
+            <a:spLocks/>
+          </p:cNvSpPr>
+          <p:nvPr/>
+        </p:nvSpPr>
+        <p:spPr>
+          <a:xfrm>
+            <a:off x="8090261" y="4707613"/>
+            <a:ext cx="3798872" cy="2636311"/>
+          </a:xfrm>
+          <a:prstGeom prst="rect">
+            <a:avLst/>
+          </a:prstGeom>
+        </p:spPr>
+        <p:txBody>
+          <a:bodyPr vert="horz" lIns="91440" tIns="45720" rIns="91440" bIns="45720" rtlCol="0">
+            <a:normAutofit/>
+          </a:bodyPr>
+          <a:lstStyle>
+            <a:lvl1pPr marL="342900" indent="-342900" algn="l" defTabSz="457200" rtl="0" eaLnBrk="1" latinLnBrk="0" hangingPunct="1">
+              <a:spcBef>
+                <a:spcPts val="1000"/>
+              </a:spcBef>
+              <a:spcAft>
+                <a:spcPts val="0"/>
+              </a:spcAft>
+              <a:buClr>
+                <a:schemeClr val="accent1"/>
+              </a:buClr>
+              <a:buSzPct val="80000"/>
+              <a:buFont typeface="Wingdings 3" charset="2"/>
+              <a:buChar char=""/>
+              <a:defRPr sz="1800" kern="1200">
+                <a:solidFill>
+                  <a:schemeClr val="tx1">
+                    <a:lumMod val="75000"/>
+                    <a:lumOff val="25000"/>
+                  </a:schemeClr>
+                </a:solidFill>
+                <a:latin typeface="+mn-lt"/>
+                <a:ea typeface="+mn-ea"/>
+                <a:cs typeface="+mn-cs"/>
+              </a:defRPr>
+            </a:lvl1pPr>
+            <a:lvl2pPr marL="742950" indent="-285750" algn="l" defTabSz="457200" rtl="0" eaLnBrk="1" latinLnBrk="0" hangingPunct="1">
+              <a:spcBef>
+                <a:spcPts val="1000"/>
+              </a:spcBef>
+              <a:spcAft>
+                <a:spcPts val="0"/>
+              </a:spcAft>
+              <a:buClr>
+                <a:schemeClr val="accent1"/>
+              </a:buClr>
+              <a:buSzPct val="80000"/>
+              <a:buFont typeface="Wingdings 3" charset="2"/>
+              <a:buChar char=""/>
+              <a:defRPr sz="1600" kern="1200">
+                <a:solidFill>
+                  <a:schemeClr val="tx1">
+                    <a:lumMod val="75000"/>
+                    <a:lumOff val="25000"/>
+                  </a:schemeClr>
+                </a:solidFill>
+                <a:latin typeface="+mn-lt"/>
+                <a:ea typeface="+mn-ea"/>
+                <a:cs typeface="+mn-cs"/>
+              </a:defRPr>
+            </a:lvl2pPr>
+            <a:lvl3pPr marL="1143000" indent="-228600" algn="l" defTabSz="457200" rtl="0" eaLnBrk="1" latinLnBrk="0" hangingPunct="1">
+              <a:spcBef>
+                <a:spcPts val="1000"/>
+              </a:spcBef>
+              <a:spcAft>
+                <a:spcPts val="0"/>
+              </a:spcAft>
+              <a:buClr>
+                <a:schemeClr val="accent1"/>
+              </a:buClr>
+              <a:buSzPct val="80000"/>
+              <a:buFont typeface="Wingdings 3" charset="2"/>
+              <a:buChar char=""/>
+              <a:defRPr sz="1400" kern="1200">
+                <a:solidFill>
+                  <a:schemeClr val="tx1">
+                    <a:lumMod val="75000"/>
+                    <a:lumOff val="25000"/>
+                  </a:schemeClr>
+                </a:solidFill>
+                <a:latin typeface="+mn-lt"/>
+                <a:ea typeface="+mn-ea"/>
+                <a:cs typeface="+mn-cs"/>
+              </a:defRPr>
+            </a:lvl3pPr>
+            <a:lvl4pPr marL="1600200" indent="-228600" algn="l" defTabSz="457200" rtl="0" eaLnBrk="1" latinLnBrk="0" hangingPunct="1">
+              <a:spcBef>
+                <a:spcPts val="1000"/>
+              </a:spcBef>
+              <a:spcAft>
+                <a:spcPts val="0"/>
+              </a:spcAft>
+              <a:buClr>
+                <a:schemeClr val="accent1"/>
+              </a:buClr>
+              <a:buSzPct val="80000"/>
+              <a:buFont typeface="Wingdings 3" charset="2"/>
+              <a:buChar char=""/>
+              <a:defRPr sz="1200" kern="1200">
+                <a:solidFill>
+                  <a:schemeClr val="tx1">
+                    <a:lumMod val="75000"/>
+                    <a:lumOff val="25000"/>
+                  </a:schemeClr>
+                </a:solidFill>
+                <a:latin typeface="+mn-lt"/>
+                <a:ea typeface="+mn-ea"/>
+                <a:cs typeface="+mn-cs"/>
+              </a:defRPr>
+            </a:lvl4pPr>
+            <a:lvl5pPr marL="2057400" indent="-228600" algn="l" defTabSz="457200" rtl="0" eaLnBrk="1" latinLnBrk="0" hangingPunct="1">
+              <a:spcBef>
+                <a:spcPts val="1000"/>
+              </a:spcBef>
+              <a:spcAft>
+                <a:spcPts val="0"/>
+              </a:spcAft>
+              <a:buClr>
+                <a:schemeClr val="accent1"/>
+              </a:buClr>
+              <a:buSzPct val="80000"/>
+              <a:buFont typeface="Wingdings 3" charset="2"/>
+              <a:buChar char=""/>
+              <a:defRPr sz="1200" kern="1200">
+                <a:solidFill>
+                  <a:schemeClr val="tx1">
+                    <a:lumMod val="75000"/>
+                    <a:lumOff val="25000"/>
+                  </a:schemeClr>
+                </a:solidFill>
+                <a:latin typeface="+mn-lt"/>
+                <a:ea typeface="+mn-ea"/>
+                <a:cs typeface="+mn-cs"/>
+              </a:defRPr>
+            </a:lvl5pPr>
+            <a:lvl6pPr marL="2514600" indent="-228600" algn="l" defTabSz="457200" rtl="0" eaLnBrk="1" latinLnBrk="0" hangingPunct="1">
+              <a:spcBef>
+                <a:spcPts val="1000"/>
+              </a:spcBef>
+              <a:spcAft>
+                <a:spcPts val="0"/>
+              </a:spcAft>
+              <a:buClr>
+                <a:schemeClr val="accent1"/>
+              </a:buClr>
+              <a:buSzPct val="80000"/>
+              <a:buFont typeface="Wingdings 3" charset="2"/>
+              <a:buChar char=""/>
+              <a:defRPr sz="1200" kern="1200">
+                <a:solidFill>
+                  <a:schemeClr val="tx1">
+                    <a:lumMod val="75000"/>
+                    <a:lumOff val="25000"/>
+                  </a:schemeClr>
+                </a:solidFill>
+                <a:latin typeface="+mn-lt"/>
+                <a:ea typeface="+mn-ea"/>
+                <a:cs typeface="+mn-cs"/>
+              </a:defRPr>
+            </a:lvl6pPr>
+            <a:lvl7pPr marL="2971800" indent="-228600" algn="l" defTabSz="457200" rtl="0" eaLnBrk="1" latinLnBrk="0" hangingPunct="1">
+              <a:spcBef>
+                <a:spcPts val="1000"/>
+              </a:spcBef>
+              <a:spcAft>
+                <a:spcPts val="0"/>
+              </a:spcAft>
+              <a:buClr>
+                <a:schemeClr val="accent1"/>
+              </a:buClr>
+              <a:buSzPct val="80000"/>
+              <a:buFont typeface="Wingdings 3" charset="2"/>
+              <a:buChar char=""/>
+              <a:defRPr sz="1200" kern="1200">
+                <a:solidFill>
+                  <a:schemeClr val="tx1">
+                    <a:lumMod val="75000"/>
+                    <a:lumOff val="25000"/>
+                  </a:schemeClr>
+                </a:solidFill>
+                <a:latin typeface="+mn-lt"/>
+                <a:ea typeface="+mn-ea"/>
+                <a:cs typeface="+mn-cs"/>
+              </a:defRPr>
+            </a:lvl7pPr>
+            <a:lvl8pPr marL="3429000" indent="-228600" algn="l" defTabSz="457200" rtl="0" eaLnBrk="1" latinLnBrk="0" hangingPunct="1">
+              <a:spcBef>
+                <a:spcPts val="1000"/>
+              </a:spcBef>
+              <a:spcAft>
+                <a:spcPts val="0"/>
+              </a:spcAft>
+              <a:buClr>
+                <a:schemeClr val="accent1"/>
+              </a:buClr>
+              <a:buSzPct val="80000"/>
+              <a:buFont typeface="Wingdings 3" charset="2"/>
+              <a:buChar char=""/>
+              <a:defRPr sz="1200" kern="1200">
+                <a:solidFill>
+                  <a:schemeClr val="tx1">
+                    <a:lumMod val="75000"/>
+                    <a:lumOff val="25000"/>
+                  </a:schemeClr>
+                </a:solidFill>
+                <a:latin typeface="+mn-lt"/>
+                <a:ea typeface="+mn-ea"/>
+                <a:cs typeface="+mn-cs"/>
+              </a:defRPr>
+            </a:lvl8pPr>
+            <a:lvl9pPr marL="3886200" indent="-228600" algn="l" defTabSz="457200" rtl="0" eaLnBrk="1" latinLnBrk="0" hangingPunct="1">
+              <a:spcBef>
+                <a:spcPts val="1000"/>
+              </a:spcBef>
+              <a:spcAft>
+                <a:spcPts val="0"/>
+              </a:spcAft>
+              <a:buClr>
+                <a:schemeClr val="accent1"/>
+              </a:buClr>
+              <a:buSzPct val="80000"/>
+              <a:buFont typeface="Wingdings 3" charset="2"/>
+              <a:buChar char=""/>
+              <a:defRPr sz="1200" kern="1200">
+                <a:solidFill>
+                  <a:schemeClr val="tx1">
+                    <a:lumMod val="75000"/>
+                    <a:lumOff val="25000"/>
+                  </a:schemeClr>
+                </a:solidFill>
+                <a:latin typeface="+mn-lt"/>
+                <a:ea typeface="+mn-ea"/>
+                <a:cs typeface="+mn-cs"/>
+              </a:defRPr>
+            </a:lvl9pPr>
+          </a:lstStyle>
+          <a:p>
+            <a:r>
+              <a:rPr lang="es-ES" dirty="0" smtClean="0"/>
+              <a:t>Enemigo REY.</a:t>
+            </a:r>
+            <a:endParaRPr lang="en-US" dirty="0"/>
+          </a:p>
+        </p:txBody>
+      </p:sp>
+    </p:spTree>
+    <p:extLst>
+      <p:ext uri="{BB962C8B-B14F-4D97-AF65-F5344CB8AC3E}">
+        <p14:creationId xmlns:p14="http://schemas.microsoft.com/office/powerpoint/2010/main" val="342390902"/>
+      </p:ext>
+    </p:extLst>
+  </p:cSld>
+  <p:clrMapOvr>
+    <a:masterClrMapping/>
+  </p:clrMapOvr>
 </p:sld>
 </file>
 
@@ -6199,6 +7946,13 @@
   <p:clrMapOvr>
     <a:masterClrMapping/>
   </p:clrMapOvr>
+  <p:timing>
+    <p:tnLst>
+      <p:par>
+        <p:cTn id="1" dur="indefinite" restart="never" nodeType="tmRoot"/>
+      </p:par>
+    </p:tnLst>
+  </p:timing>
 </p:sld>
 </file>
 
@@ -6438,6 +8192,13 @@
   <p:clrMapOvr>
     <a:masterClrMapping/>
   </p:clrMapOvr>
+  <p:timing>
+    <p:tnLst>
+      <p:par>
+        <p:cTn id="1" dur="indefinite" restart="never" nodeType="tmRoot"/>
+      </p:par>
+    </p:tnLst>
+  </p:timing>
 </p:sld>
 </file>
 
@@ -6688,6 +8449,13 @@
   <p:clrMapOvr>
     <a:masterClrMapping/>
   </p:clrMapOvr>
+  <p:timing>
+    <p:tnLst>
+      <p:par>
+        <p:cTn id="1" dur="indefinite" restart="never" nodeType="tmRoot"/>
+      </p:par>
+    </p:tnLst>
+  </p:timing>
 </p:sld>
 </file>
 
@@ -8221,6 +9989,13 @@
   <p:clrMapOvr>
     <a:masterClrMapping/>
   </p:clrMapOvr>
+  <p:timing>
+    <p:tnLst>
+      <p:par>
+        <p:cTn id="1" dur="indefinite" restart="never" nodeType="tmRoot"/>
+      </p:par>
+    </p:tnLst>
+  </p:timing>
 </p:sld>
 </file>
 
@@ -9514,6 +11289,13 @@
   <p:clrMapOvr>
     <a:masterClrMapping/>
   </p:clrMapOvr>
+  <p:timing>
+    <p:tnLst>
+      <p:par>
+        <p:cTn id="1" dur="indefinite" restart="never" nodeType="tmRoot"/>
+      </p:par>
+    </p:tnLst>
+  </p:timing>
 </p:sld>
 </file>
 
@@ -9937,6 +11719,13 @@
   <p:clrMapOvr>
     <a:masterClrMapping/>
   </p:clrMapOvr>
+  <p:timing>
+    <p:tnLst>
+      <p:par>
+        <p:cTn id="1" dur="indefinite" restart="never" nodeType="tmRoot"/>
+      </p:par>
+    </p:tnLst>
+  </p:timing>
 </p:sld>
 </file>
 

</xml_diff>